<commit_message>
Pulled code from ELECTRO to split up data
</commit_message>
<xml_diff>
--- a/pptx/6-5-2022-Proposal.pptx
+++ b/pptx/6-5-2022-Proposal.pptx
@@ -5,7 +5,7 @@
     <p:sldMasterId id="2147483648" r:id="rId1"/>
   </p:sldMasterIdLst>
   <p:notesMasterIdLst>
-    <p:notesMasterId r:id="rId10"/>
+    <p:notesMasterId r:id="rId11"/>
   </p:notesMasterIdLst>
   <p:sldIdLst>
     <p:sldId id="256" r:id="rId2"/>
@@ -16,6 +16,7 @@
     <p:sldId id="261" r:id="rId7"/>
     <p:sldId id="262" r:id="rId8"/>
     <p:sldId id="263" r:id="rId9"/>
+    <p:sldId id="264" r:id="rId10"/>
   </p:sldIdLst>
   <p:sldSz cx="12192000" cy="6858000"/>
   <p:notesSz cx="6858000" cy="9144000"/>
@@ -204,7 +205,7 @@
           <a:p>
             <a:fld id="{2351EA8E-A4EF-468F-B7E8-E331C362D4F4}" type="datetimeFigureOut">
               <a:rPr lang="en-US" smtClean="0"/>
-              <a:t>6/1/2023</a:t>
+              <a:t>6/6/23</a:t>
             </a:fld>
             <a:endParaRPr lang="en-US"/>
           </a:p>
@@ -618,7 +619,7 @@
           <a:p>
             <a:fld id="{69E82754-70D9-4BCA-B25C-FF6AADBAE5FB}" type="datetime1">
               <a:rPr lang="en-US" smtClean="0"/>
-              <a:t>6/1/2023</a:t>
+              <a:t>6/6/23</a:t>
             </a:fld>
             <a:endParaRPr lang="en-US"/>
           </a:p>
@@ -816,7 +817,7 @@
           <a:p>
             <a:fld id="{A6019BB0-01CF-4256-AEF5-84151E1F9946}" type="datetime1">
               <a:rPr lang="en-US" smtClean="0"/>
-              <a:t>6/1/2023</a:t>
+              <a:t>6/6/23</a:t>
             </a:fld>
             <a:endParaRPr lang="en-US"/>
           </a:p>
@@ -1024,7 +1025,7 @@
           <a:p>
             <a:fld id="{88CE413D-1AB9-4356-A320-E5EE4EB1C89A}" type="datetime1">
               <a:rPr lang="en-US" smtClean="0"/>
-              <a:t>6/1/2023</a:t>
+              <a:t>6/6/23</a:t>
             </a:fld>
             <a:endParaRPr lang="en-US"/>
           </a:p>
@@ -1222,7 +1223,7 @@
           <a:p>
             <a:fld id="{69ADD3DD-F4DD-4BC5-995B-33C99D152198}" type="datetime1">
               <a:rPr lang="en-US" smtClean="0"/>
-              <a:t>6/1/2023</a:t>
+              <a:t>6/6/23</a:t>
             </a:fld>
             <a:endParaRPr lang="en-US"/>
           </a:p>
@@ -1497,7 +1498,7 @@
           <a:p>
             <a:fld id="{8EA985E0-4B5E-474E-839F-BAA4435406BA}" type="datetime1">
               <a:rPr lang="en-US" smtClean="0"/>
-              <a:t>6/1/2023</a:t>
+              <a:t>6/6/23</a:t>
             </a:fld>
             <a:endParaRPr lang="en-US"/>
           </a:p>
@@ -1762,7 +1763,7 @@
           <a:p>
             <a:fld id="{703F3A14-1442-46BC-9F6C-150EA695B777}" type="datetime1">
               <a:rPr lang="en-US" smtClean="0"/>
-              <a:t>6/1/2023</a:t>
+              <a:t>6/6/23</a:t>
             </a:fld>
             <a:endParaRPr lang="en-US"/>
           </a:p>
@@ -2174,7 +2175,7 @@
           <a:p>
             <a:fld id="{A950989D-01B7-4133-8B63-D7D30B80621F}" type="datetime1">
               <a:rPr lang="en-US" smtClean="0"/>
-              <a:t>6/1/2023</a:t>
+              <a:t>6/6/23</a:t>
             </a:fld>
             <a:endParaRPr lang="en-US"/>
           </a:p>
@@ -2315,7 +2316,7 @@
           <a:p>
             <a:fld id="{195434ED-B63F-4087-9FB0-852F56138258}" type="datetime1">
               <a:rPr lang="en-US" smtClean="0"/>
-              <a:t>6/1/2023</a:t>
+              <a:t>6/6/23</a:t>
             </a:fld>
             <a:endParaRPr lang="en-US"/>
           </a:p>
@@ -2428,7 +2429,7 @@
           <a:p>
             <a:fld id="{71508BDC-3F7F-458F-B014-C834CEF8E9E1}" type="datetime1">
               <a:rPr lang="en-US" smtClean="0"/>
-              <a:t>6/1/2023</a:t>
+              <a:t>6/6/23</a:t>
             </a:fld>
             <a:endParaRPr lang="en-US"/>
           </a:p>
@@ -2739,7 +2740,7 @@
           <a:p>
             <a:fld id="{DBF53561-D951-437D-B427-08CBD32BAF85}" type="datetime1">
               <a:rPr lang="en-US" smtClean="0"/>
-              <a:t>6/1/2023</a:t>
+              <a:t>6/6/23</a:t>
             </a:fld>
             <a:endParaRPr lang="en-US"/>
           </a:p>
@@ -3027,7 +3028,7 @@
           <a:p>
             <a:fld id="{E5301883-C51A-4CC1-8AE9-3B5617A11C35}" type="datetime1">
               <a:rPr lang="en-US" smtClean="0"/>
-              <a:t>6/1/2023</a:t>
+              <a:t>6/6/23</a:t>
             </a:fld>
             <a:endParaRPr lang="en-US"/>
           </a:p>
@@ -3268,7 +3269,7 @@
           <a:p>
             <a:fld id="{413B1FD2-CBA1-49D5-9A29-9C200961EF43}" type="datetime1">
               <a:rPr lang="en-US" smtClean="0"/>
-              <a:t>6/1/2023</a:t>
+              <a:t>6/6/23</a:t>
             </a:fld>
             <a:endParaRPr lang="en-US"/>
           </a:p>
@@ -4719,6 +4720,135 @@
     <p:extLst>
       <p:ext uri="{BB962C8B-B14F-4D97-AF65-F5344CB8AC3E}">
         <p14:creationId xmlns:p14="http://schemas.microsoft.com/office/powerpoint/2010/main" val="1766535460"/>
+      </p:ext>
+    </p:extLst>
+  </p:cSld>
+  <p:clrMapOvr>
+    <a:masterClrMapping/>
+  </p:clrMapOvr>
+</p:sld>
+</file>
+
+<file path=ppt/slides/slide9.xml><?xml version="1.0" encoding="utf-8"?>
+<p:sld xmlns:a="http://schemas.openxmlformats.org/drawingml/2006/main" xmlns:r="http://schemas.openxmlformats.org/officeDocument/2006/relationships" xmlns:p="http://schemas.openxmlformats.org/presentationml/2006/main">
+  <p:cSld>
+    <p:spTree>
+      <p:nvGrpSpPr>
+        <p:cNvPr id="1" name=""/>
+        <p:cNvGrpSpPr/>
+        <p:nvPr/>
+      </p:nvGrpSpPr>
+      <p:grpSpPr>
+        <a:xfrm>
+          <a:off x="0" y="0"/>
+          <a:ext cx="0" cy="0"/>
+          <a:chOff x="0" y="0"/>
+          <a:chExt cx="0" cy="0"/>
+        </a:xfrm>
+      </p:grpSpPr>
+      <p:sp>
+        <p:nvSpPr>
+          <p:cNvPr id="2" name="Title 1">
+            <a:extLst>
+              <a:ext uri="{FF2B5EF4-FFF2-40B4-BE49-F238E27FC236}">
+                <a16:creationId xmlns:a16="http://schemas.microsoft.com/office/drawing/2014/main" id="{4CE4C1A7-3876-548F-1CA2-26FE32974FFC}"/>
+              </a:ext>
+            </a:extLst>
+          </p:cNvPr>
+          <p:cNvSpPr>
+            <a:spLocks noGrp="1"/>
+          </p:cNvSpPr>
+          <p:nvPr>
+            <p:ph type="title"/>
+          </p:nvPr>
+        </p:nvSpPr>
+        <p:spPr/>
+        <p:txBody>
+          <a:bodyPr/>
+          <a:lstStyle/>
+          <a:p>
+            <a:r>
+              <a:rPr lang="en-US" dirty="0"/>
+              <a:t>Discussion</a:t>
+            </a:r>
+          </a:p>
+        </p:txBody>
+      </p:sp>
+      <p:sp>
+        <p:nvSpPr>
+          <p:cNvPr id="3" name="Content Placeholder 2">
+            <a:extLst>
+              <a:ext uri="{FF2B5EF4-FFF2-40B4-BE49-F238E27FC236}">
+                <a16:creationId xmlns:a16="http://schemas.microsoft.com/office/drawing/2014/main" id="{99D734BE-8628-C780-3645-FA72D4BD302D}"/>
+              </a:ext>
+            </a:extLst>
+          </p:cNvPr>
+          <p:cNvSpPr>
+            <a:spLocks noGrp="1"/>
+          </p:cNvSpPr>
+          <p:nvPr>
+            <p:ph idx="1"/>
+          </p:nvPr>
+        </p:nvSpPr>
+        <p:spPr/>
+        <p:txBody>
+          <a:bodyPr/>
+          <a:lstStyle/>
+          <a:p>
+            <a:r>
+              <a:rPr lang="en-US" dirty="0"/>
+              <a:t>Numerical Mapping might be challenging</a:t>
+            </a:r>
+          </a:p>
+          <a:p>
+            <a:pPr lvl="1"/>
+            <a:r>
+              <a:rPr lang="en-US" dirty="0"/>
+              <a:t>Baseline?</a:t>
+            </a:r>
+          </a:p>
+          <a:p>
+            <a:pPr lvl="2"/>
+            <a:r>
+              <a:rPr lang="en-US" dirty="0"/>
+              <a:t>Can we test masking </a:t>
+            </a:r>
+            <a:r>
+              <a:rPr lang="en-US"/>
+              <a:t>method like BERT</a:t>
+            </a:r>
+          </a:p>
+        </p:txBody>
+      </p:sp>
+      <p:sp>
+        <p:nvSpPr>
+          <p:cNvPr id="4" name="Footer Placeholder 3">
+            <a:extLst>
+              <a:ext uri="{FF2B5EF4-FFF2-40B4-BE49-F238E27FC236}">
+                <a16:creationId xmlns:a16="http://schemas.microsoft.com/office/drawing/2014/main" id="{E6184AF3-979F-ACF1-4F07-C07D0387F041}"/>
+              </a:ext>
+            </a:extLst>
+          </p:cNvPr>
+          <p:cNvSpPr>
+            <a:spLocks noGrp="1"/>
+          </p:cNvSpPr>
+          <p:nvPr>
+            <p:ph type="ftr" sz="quarter" idx="11"/>
+          </p:nvPr>
+        </p:nvSpPr>
+        <p:spPr/>
+        <p:txBody>
+          <a:bodyPr/>
+          <a:lstStyle/>
+          <a:p>
+            <a:endParaRPr lang="en-US" dirty="0"/>
+          </a:p>
+        </p:txBody>
+      </p:sp>
+    </p:spTree>
+    <p:extLst>
+      <p:ext uri="{BB962C8B-B14F-4D97-AF65-F5344CB8AC3E}">
+        <p14:creationId xmlns:p14="http://schemas.microsoft.com/office/powerpoint/2010/main" val="416585063"/>
       </p:ext>
     </p:extLst>
   </p:cSld>

</xml_diff>